<commit_message>
modify phi -> logPhi
</commit_message>
<xml_diff>
--- a/References/NoFreqTweedie.pptx
+++ b/References/NoFreqTweedie.pptx
@@ -202,7 +202,7 @@
           </a:lstStyle>
           <a:p>
             <a:fld id="{2C3BF321-5C6A-9140-BEDD-973ED4BA39D7}" type="datetimeFigureOut">
-              <a:t>2018/11/18</a:t>
+              <a:t>2018/11/26</a:t>
             </a:fld>
             <a:endParaRPr kumimoji="1" lang="ja-JP" altLang="en-US"/>
           </a:p>
@@ -1936,7 +1936,7 @@
           <a:lstStyle/>
           <a:p>
             <a:fld id="{0D822AD9-1FF1-2C48-8B31-2D23F0A31528}" type="datetimeFigureOut">
-              <a:t>2018/11/18</a:t>
+              <a:t>2018/11/26</a:t>
             </a:fld>
             <a:endParaRPr kumimoji="1" lang="ja-JP" altLang="en-US"/>
           </a:p>
@@ -2139,7 +2139,7 @@
           <a:lstStyle/>
           <a:p>
             <a:fld id="{0D822AD9-1FF1-2C48-8B31-2D23F0A31528}" type="datetimeFigureOut">
-              <a:t>2018/11/18</a:t>
+              <a:t>2018/11/26</a:t>
             </a:fld>
             <a:endParaRPr kumimoji="1" lang="ja-JP" altLang="en-US"/>
           </a:p>
@@ -2352,7 +2352,7 @@
           <a:lstStyle/>
           <a:p>
             <a:fld id="{0D822AD9-1FF1-2C48-8B31-2D23F0A31528}" type="datetimeFigureOut">
-              <a:t>2018/11/18</a:t>
+              <a:t>2018/11/26</a:t>
             </a:fld>
             <a:endParaRPr kumimoji="1" lang="ja-JP" altLang="en-US"/>
           </a:p>
@@ -2555,7 +2555,7 @@
           <a:lstStyle/>
           <a:p>
             <a:fld id="{0D822AD9-1FF1-2C48-8B31-2D23F0A31528}" type="datetimeFigureOut">
-              <a:t>2018/11/18</a:t>
+              <a:t>2018/11/26</a:t>
             </a:fld>
             <a:endParaRPr kumimoji="1" lang="ja-JP" altLang="en-US"/>
           </a:p>
@@ -2863,7 +2863,7 @@
           <a:lstStyle/>
           <a:p>
             <a:fld id="{0D822AD9-1FF1-2C48-8B31-2D23F0A31528}" type="datetimeFigureOut">
-              <a:t>2018/11/18</a:t>
+              <a:t>2018/11/26</a:t>
             </a:fld>
             <a:endParaRPr kumimoji="1" lang="ja-JP" altLang="en-US"/>
           </a:p>
@@ -3140,7 +3140,7 @@
           <a:lstStyle/>
           <a:p>
             <a:fld id="{0D822AD9-1FF1-2C48-8B31-2D23F0A31528}" type="datetimeFigureOut">
-              <a:t>2018/11/18</a:t>
+              <a:t>2018/11/26</a:t>
             </a:fld>
             <a:endParaRPr kumimoji="1" lang="ja-JP" altLang="en-US"/>
           </a:p>
@@ -3634,7 +3634,7 @@
           <a:lstStyle/>
           <a:p>
             <a:fld id="{0D822AD9-1FF1-2C48-8B31-2D23F0A31528}" type="datetimeFigureOut">
-              <a:t>2018/11/18</a:t>
+              <a:t>2018/11/26</a:t>
             </a:fld>
             <a:endParaRPr kumimoji="1" lang="ja-JP" altLang="en-US"/>
           </a:p>
@@ -3773,7 +3773,7 @@
           <a:lstStyle/>
           <a:p>
             <a:fld id="{0D822AD9-1FF1-2C48-8B31-2D23F0A31528}" type="datetimeFigureOut">
-              <a:t>2018/11/18</a:t>
+              <a:t>2018/11/26</a:t>
             </a:fld>
             <a:endParaRPr kumimoji="1" lang="ja-JP" altLang="en-US"/>
           </a:p>
@@ -3884,7 +3884,7 @@
           <a:lstStyle/>
           <a:p>
             <a:fld id="{0D822AD9-1FF1-2C48-8B31-2D23F0A31528}" type="datetimeFigureOut">
-              <a:t>2018/11/18</a:t>
+              <a:t>2018/11/26</a:t>
             </a:fld>
             <a:endParaRPr kumimoji="1" lang="ja-JP" altLang="en-US"/>
           </a:p>
@@ -4235,7 +4235,7 @@
           <a:lstStyle/>
           <a:p>
             <a:fld id="{0D822AD9-1FF1-2C48-8B31-2D23F0A31528}" type="datetimeFigureOut">
-              <a:t>2018/11/18</a:t>
+              <a:t>2018/11/26</a:t>
             </a:fld>
             <a:endParaRPr kumimoji="1" lang="ja-JP" altLang="en-US"/>
           </a:p>
@@ -4556,7 +4556,7 @@
           <a:lstStyle/>
           <a:p>
             <a:fld id="{0D822AD9-1FF1-2C48-8B31-2D23F0A31528}" type="datetimeFigureOut">
-              <a:t>2018/11/18</a:t>
+              <a:t>2018/11/26</a:t>
             </a:fld>
             <a:endParaRPr kumimoji="1" lang="ja-JP" altLang="en-US"/>
           </a:p>
@@ -4802,7 +4802,7 @@
           </a:lstStyle>
           <a:p>
             <a:fld id="{0D822AD9-1FF1-2C48-8B31-2D23F0A31528}" type="datetimeFigureOut">
-              <a:t>2018/11/18</a:t>
+              <a:t>2018/11/26</a:t>
             </a:fld>
             <a:endParaRPr kumimoji="1" lang="ja-JP" altLang="en-US"/>
           </a:p>
@@ -9309,8 +9309,8 @@
           </a:fontRef>
         </p:style>
       </p:cxnSp>
-      <mc:AlternateContent xmlns:mc="http://schemas.openxmlformats.org/markup-compatibility/2006">
-        <mc:Choice xmlns:a14="http://schemas.microsoft.com/office/drawing/2010/main" Requires="a14">
+      <mc:AlternateContent xmlns:mc="http://schemas.openxmlformats.org/markup-compatibility/2006" xmlns:a14="http://schemas.microsoft.com/office/drawing/2010/main">
+        <mc:Choice Requires="a14">
           <p:sp>
             <p:nvSpPr>
               <p:cNvPr id="29" name="テキスト ボックス 28">
@@ -9635,7 +9635,7 @@
             </p:txBody>
           </p:sp>
         </mc:Choice>
-        <mc:Fallback>
+        <mc:Fallback xmlns="">
           <p:sp>
             <p:nvSpPr>
               <p:cNvPr id="29" name="テキスト ボックス 28">
@@ -12766,6 +12766,265 @@
               <a:buChar char="ü"/>
             </a:pPr>
             <a:endParaRPr lang="en-US" altLang="ja-JP" sz="1200"/>
+          </a:p>
+        </p:txBody>
+      </p:sp>
+      <p:sp>
+        <p:nvSpPr>
+          <p:cNvPr id="2" name="テキスト ボックス 1">
+            <a:extLst>
+              <a:ext uri="{FF2B5EF4-FFF2-40B4-BE49-F238E27FC236}">
+                <a16:creationId xmlns:a16="http://schemas.microsoft.com/office/drawing/2014/main" id="{B8A9D090-0D1A-5641-90A8-161F1761A6AB}"/>
+              </a:ext>
+            </a:extLst>
+          </p:cNvPr>
+          <p:cNvSpPr txBox="1"/>
+          <p:nvPr/>
+        </p:nvSpPr>
+        <p:spPr>
+          <a:xfrm>
+            <a:off x="269826" y="3954784"/>
+            <a:ext cx="6152646" cy="2862322"/>
+          </a:xfrm>
+          <a:prstGeom prst="rect">
+            <a:avLst/>
+          </a:prstGeom>
+          <a:noFill/>
+        </p:spPr>
+        <p:txBody>
+          <a:bodyPr wrap="none" rtlCol="0">
+            <a:spAutoFit/>
+          </a:bodyPr>
+          <a:lstStyle/>
+          <a:p>
+            <a:r>
+              <a:rPr kumimoji="1" lang="en-US" altLang="ja-JP" b="1"/>
+              <a:t>1. phi^2</a:t>
+            </a:r>
+            <a:r>
+              <a:rPr kumimoji="1" lang="ja-JP" altLang="en-US" b="1"/>
+              <a:t>で</a:t>
+            </a:r>
+            <a:r>
+              <a:rPr kumimoji="1" lang="en-US" altLang="ja-JP" b="1"/>
+              <a:t>overflow</a:t>
+            </a:r>
+            <a:r>
+              <a:rPr kumimoji="1" lang="ja-JP" altLang="en-US" b="1"/>
+              <a:t>する</a:t>
+            </a:r>
+            <a:r>
+              <a:rPr kumimoji="1" lang="en-US" altLang="ja-JP" b="1"/>
+              <a:t>.</a:t>
+            </a:r>
+          </a:p>
+          <a:p>
+            <a:r>
+              <a:rPr lang="en-US" altLang="ja-JP"/>
+              <a:t>(phi</a:t>
+            </a:r>
+            <a:r>
+              <a:rPr lang="ja-JP" altLang="en-US"/>
+              <a:t>＝</a:t>
+            </a:r>
+            <a:r>
+              <a:rPr lang="en-US" altLang="ja-JP"/>
+              <a:t>exp(Zγ)</a:t>
+            </a:r>
+            <a:r>
+              <a:rPr lang="ja-JP" altLang="en-US"/>
+              <a:t>で限界まで大きくなっているため</a:t>
+            </a:r>
+            <a:r>
+              <a:rPr lang="en-US" altLang="ja-JP"/>
+              <a:t>)</a:t>
+            </a:r>
+          </a:p>
+          <a:p>
+            <a:r>
+              <a:rPr lang="en-US" altLang="ja-JP"/>
+              <a:t>1. </a:t>
+            </a:r>
+            <a:r>
+              <a:rPr lang="ja-JP" altLang="en-US"/>
+              <a:t>そもそも</a:t>
+            </a:r>
+            <a:r>
+              <a:rPr lang="en-US" altLang="ja-JP"/>
+              <a:t>logPhi</a:t>
+            </a:r>
+            <a:r>
+              <a:rPr lang="ja-JP" altLang="en-US"/>
+              <a:t>を計算することにする</a:t>
+            </a:r>
+            <a:r>
+              <a:rPr lang="en-US" altLang="ja-JP"/>
+              <a:t>.</a:t>
+            </a:r>
+          </a:p>
+          <a:p>
+            <a:r>
+              <a:rPr lang="en-US" altLang="ja-JP"/>
+              <a:t>2. </a:t>
+            </a:r>
+            <a:r>
+              <a:rPr lang="ja-JP" altLang="en-US"/>
+              <a:t>入力を正規化なり何なりして絶対値を小さくする</a:t>
+            </a:r>
+            <a:r>
+              <a:rPr lang="en-US" altLang="ja-JP"/>
+              <a:t>.</a:t>
+            </a:r>
+          </a:p>
+          <a:p>
+            <a:endParaRPr kumimoji="1" lang="en-US" altLang="ja-JP"/>
+          </a:p>
+          <a:p>
+            <a:r>
+              <a:rPr lang="en-US" altLang="ja-JP" b="1"/>
+              <a:t>2. Nsample&gt;1</a:t>
+            </a:r>
+            <a:r>
+              <a:rPr lang="ja-JP" altLang="en-US" b="1"/>
+              <a:t>万程度で</a:t>
+            </a:r>
+            <a:r>
+              <a:rPr lang="en-US" altLang="ja-JP" b="1"/>
+              <a:t>MemoryError.</a:t>
+            </a:r>
+          </a:p>
+          <a:p>
+            <a:r>
+              <a:rPr kumimoji="1" lang="en-US" altLang="ja-JP"/>
+              <a:t>(hatMatrix</a:t>
+            </a:r>
+            <a:r>
+              <a:rPr kumimoji="1" lang="ja-JP" altLang="en-US"/>
+              <a:t>の計算時</a:t>
+            </a:r>
+            <a:r>
+              <a:rPr kumimoji="1" lang="en-US" altLang="ja-JP"/>
+              <a:t>)</a:t>
+            </a:r>
+          </a:p>
+          <a:p>
+            <a:r>
+              <a:rPr lang="ja-JP" altLang="en-US"/>
+              <a:t>流石に使え無さすぎるので</a:t>
+            </a:r>
+            <a:r>
+              <a:rPr lang="en-US" altLang="ja-JP"/>
+              <a:t>10</a:t>
+            </a:r>
+            <a:r>
+              <a:rPr lang="ja-JP" altLang="en-US"/>
+              <a:t>万程度のエントリに対して</a:t>
+            </a:r>
+            <a:endParaRPr lang="en-US" altLang="ja-JP"/>
+          </a:p>
+          <a:p>
+            <a:r>
+              <a:rPr kumimoji="1" lang="ja-JP" altLang="en-US"/>
+              <a:t>計算できるようにしたい</a:t>
+            </a:r>
+            <a:r>
+              <a:rPr kumimoji="1" lang="en-US" altLang="ja-JP"/>
+              <a:t>.</a:t>
+            </a:r>
+          </a:p>
+          <a:p>
+            <a:r>
+              <a:rPr kumimoji="1" lang="en-US" altLang="ja-JP"/>
+              <a:t>diagMat</a:t>
+            </a:r>
+            <a:r>
+              <a:rPr kumimoji="1" lang="ja-JP" altLang="en-US"/>
+              <a:t>が多いので</a:t>
+            </a:r>
+            <a:r>
+              <a:rPr kumimoji="1" lang="en-US" altLang="ja-JP"/>
+              <a:t>parse</a:t>
+            </a:r>
+            <a:r>
+              <a:rPr kumimoji="1" lang="ja-JP" altLang="en-US"/>
+              <a:t>な</a:t>
+            </a:r>
+            <a:r>
+              <a:rPr lang="ja-JP" altLang="en-US"/>
+              <a:t>領域を</a:t>
+            </a:r>
+            <a:r>
+              <a:rPr kumimoji="1" lang="ja-JP" altLang="en-US"/>
+              <a:t>うまく節約できないか</a:t>
+            </a:r>
+            <a:r>
+              <a:rPr kumimoji="1" lang="en-US" altLang="ja-JP"/>
+              <a:t>?</a:t>
+            </a:r>
+            <a:endParaRPr kumimoji="1" lang="ja-JP" altLang="en-US"/>
+          </a:p>
+        </p:txBody>
+      </p:sp>
+      <p:sp>
+        <p:nvSpPr>
+          <p:cNvPr id="3" name="テキスト ボックス 2">
+            <a:extLst>
+              <a:ext uri="{FF2B5EF4-FFF2-40B4-BE49-F238E27FC236}">
+                <a16:creationId xmlns:a16="http://schemas.microsoft.com/office/drawing/2014/main" id="{3B0D04B5-C659-B847-8884-A25A1B47F217}"/>
+              </a:ext>
+            </a:extLst>
+          </p:cNvPr>
+          <p:cNvSpPr txBox="1"/>
+          <p:nvPr/>
+        </p:nvSpPr>
+        <p:spPr>
+          <a:xfrm>
+            <a:off x="6728645" y="4264702"/>
+            <a:ext cx="4174541" cy="646331"/>
+          </a:xfrm>
+          <a:prstGeom prst="rect">
+            <a:avLst/>
+          </a:prstGeom>
+          <a:noFill/>
+        </p:spPr>
+        <p:txBody>
+          <a:bodyPr wrap="none" rtlCol="0">
+            <a:spAutoFit/>
+          </a:bodyPr>
+          <a:lstStyle/>
+          <a:p>
+            <a:r>
+              <a:rPr lang="en-US" altLang="ja-JP"/>
+              <a:t>1.1</a:t>
+            </a:r>
+            <a:r>
+              <a:rPr lang="ja-JP" altLang="en-US"/>
+              <a:t>を試したが、</a:t>
+            </a:r>
+            <a:r>
+              <a:rPr lang="en-US" altLang="ja-JP"/>
+              <a:t>overflow</a:t>
+            </a:r>
+            <a:r>
+              <a:rPr lang="ja-JP" altLang="en-US"/>
+              <a:t>しないものの</a:t>
+            </a:r>
+            <a:endParaRPr lang="en-US" altLang="ja-JP"/>
+          </a:p>
+          <a:p>
+            <a:r>
+              <a:rPr lang="en-US" altLang="ja-JP"/>
+              <a:t>gamma</a:t>
+            </a:r>
+            <a:r>
+              <a:rPr lang="ja-JP" altLang="en-US"/>
+              <a:t>全く収束せず</a:t>
+            </a:r>
+            <a:r>
+              <a:rPr lang="en-US" altLang="ja-JP"/>
+              <a:t>.</a:t>
+            </a:r>
+            <a:endParaRPr kumimoji="1" lang="ja-JP" altLang="en-US"/>
           </a:p>
         </p:txBody>
       </p:sp>

</xml_diff>